<commit_message>
Typos und Notizen 3-5 Deployment Strategien
</commit_message>
<xml_diff>
--- a/slides/Tag-3_5-Deployment-Strategien.pptx
+++ b/slides/Tag-3_5-Deployment-Strategien.pptx
@@ -951,6 +951,1092 @@
 </p:notesMaster>
 </file>
 
+<file path=ppt/notesSlides/notesSlide1.xml><?xml version="1.0" encoding="utf-8"?>
+<p:notes xmlns:a="http://schemas.openxmlformats.org/drawingml/2006/main" xmlns:r="http://schemas.openxmlformats.org/officeDocument/2006/relationships" xmlns:p="http://schemas.openxmlformats.org/presentationml/2006/main">
+  <p:cSld>
+    <p:spTree>
+      <p:nvGrpSpPr>
+        <p:cNvPr id="1" name=""/>
+        <p:cNvGrpSpPr/>
+        <p:nvPr/>
+      </p:nvGrpSpPr>
+      <p:grpSpPr>
+        <a:xfrm>
+          <a:off x="0" y="0"/>
+          <a:ext cx="0" cy="0"/>
+          <a:chOff x="0" y="0"/>
+          <a:chExt cx="0" cy="0"/>
+        </a:xfrm>
+      </p:grpSpPr>
+      <p:sp>
+        <p:nvSpPr>
+          <p:cNvPr id="2" name="Folienbildplatzhalter 1"/>
+          <p:cNvSpPr>
+            <a:spLocks noGrp="1" noRot="1" noChangeAspect="1"/>
+          </p:cNvSpPr>
+          <p:nvPr>
+            <p:ph type="sldImg"/>
+          </p:nvPr>
+        </p:nvSpPr>
+        <p:spPr/>
+      </p:sp>
+      <p:sp>
+        <p:nvSpPr>
+          <p:cNvPr id="3" name="Notizenplatzhalter 2"/>
+          <p:cNvSpPr>
+            <a:spLocks noGrp="1"/>
+          </p:cNvSpPr>
+          <p:nvPr>
+            <p:ph type="body" idx="1"/>
+          </p:nvPr>
+        </p:nvSpPr>
+        <p:spPr/>
+        <p:txBody>
+          <a:bodyPr/>
+          <a:lstStyle/>
+          <a:p>
+            <a:r>
+              <a:rPr lang="de-DE" noProof="0" dirty="0"/>
+              <a:t>Tendenziell lässt sich alles mit </a:t>
+            </a:r>
+            <a:r>
+              <a:rPr lang="de-DE" noProof="0" dirty="0" err="1"/>
+              <a:t>gitlabs</a:t>
+            </a:r>
+            <a:r>
+              <a:rPr lang="de-DE" noProof="0" dirty="0"/>
+              <a:t> CI/CD umsetzen</a:t>
+            </a:r>
+          </a:p>
+          <a:p>
+            <a:r>
+              <a:rPr lang="de-DE" noProof="0" dirty="0"/>
+              <a:t>Kann je nach Strategie sehr komplex werden</a:t>
+            </a:r>
+          </a:p>
+        </p:txBody>
+      </p:sp>
+      <p:sp>
+        <p:nvSpPr>
+          <p:cNvPr id="4" name="Foliennummernplatzhalter 3"/>
+          <p:cNvSpPr>
+            <a:spLocks noGrp="1"/>
+          </p:cNvSpPr>
+          <p:nvPr>
+            <p:ph type="sldNum" sz="quarter" idx="5"/>
+          </p:nvPr>
+        </p:nvSpPr>
+        <p:spPr/>
+        <p:txBody>
+          <a:bodyPr/>
+          <a:lstStyle/>
+          <a:p>
+            <a:fld id="{18182567-388C-4D33-8B7B-A651F195F118}" type="slidenum">
+              <a:rPr lang="de-DE" altLang="de-DE" smtClean="0"/>
+              <a:pPr/>
+              <a:t>2</a:t>
+            </a:fld>
+            <a:endParaRPr lang="de-DE" altLang="de-DE"/>
+          </a:p>
+        </p:txBody>
+      </p:sp>
+    </p:spTree>
+    <p:extLst>
+      <p:ext uri="{BB962C8B-B14F-4D97-AF65-F5344CB8AC3E}">
+        <p14:creationId xmlns:p14="http://schemas.microsoft.com/office/powerpoint/2010/main" val="3734563634"/>
+      </p:ext>
+    </p:extLst>
+  </p:cSld>
+  <p:clrMapOvr>
+    <a:masterClrMapping/>
+  </p:clrMapOvr>
+</p:notes>
+</file>
+
+<file path=ppt/notesSlides/notesSlide10.xml><?xml version="1.0" encoding="utf-8"?>
+<p:notes xmlns:a="http://schemas.openxmlformats.org/drawingml/2006/main" xmlns:r="http://schemas.openxmlformats.org/officeDocument/2006/relationships" xmlns:p="http://schemas.openxmlformats.org/presentationml/2006/main">
+  <p:cSld>
+    <p:spTree>
+      <p:nvGrpSpPr>
+        <p:cNvPr id="1" name=""/>
+        <p:cNvGrpSpPr/>
+        <p:nvPr/>
+      </p:nvGrpSpPr>
+      <p:grpSpPr>
+        <a:xfrm>
+          <a:off x="0" y="0"/>
+          <a:ext cx="0" cy="0"/>
+          <a:chOff x="0" y="0"/>
+          <a:chExt cx="0" cy="0"/>
+        </a:xfrm>
+      </p:grpSpPr>
+      <p:sp>
+        <p:nvSpPr>
+          <p:cNvPr id="2" name="Folienbildplatzhalter 1"/>
+          <p:cNvSpPr>
+            <a:spLocks noGrp="1" noRot="1" noChangeAspect="1"/>
+          </p:cNvSpPr>
+          <p:nvPr>
+            <p:ph type="sldImg"/>
+          </p:nvPr>
+        </p:nvSpPr>
+        <p:spPr/>
+      </p:sp>
+      <p:sp>
+        <p:nvSpPr>
+          <p:cNvPr id="3" name="Notizenplatzhalter 2"/>
+          <p:cNvSpPr>
+            <a:spLocks noGrp="1"/>
+          </p:cNvSpPr>
+          <p:nvPr>
+            <p:ph type="body" idx="1"/>
+          </p:nvPr>
+        </p:nvSpPr>
+        <p:spPr/>
+        <p:txBody>
+          <a:bodyPr/>
+          <a:lstStyle/>
+          <a:p>
+            <a:r>
+              <a:rPr lang="de-DE" dirty="0"/>
+              <a:t>Neusystem muss mit Altsystem zumindest teilweise kompatibel sein</a:t>
+            </a:r>
+            <a:br>
+              <a:rPr lang="de-DE" dirty="0"/>
+            </a:br>
+            <a:r>
+              <a:rPr lang="de-DE" dirty="0"/>
+              <a:t>Testen ob beide Systeme gleich Antworten</a:t>
+            </a:r>
+          </a:p>
+          <a:p>
+            <a:r>
+              <a:rPr lang="de-DE" dirty="0" err="1"/>
+              <a:t>Performanztests</a:t>
+            </a:r>
+            <a:endParaRPr lang="de-DE" dirty="0"/>
+          </a:p>
+        </p:txBody>
+      </p:sp>
+      <p:sp>
+        <p:nvSpPr>
+          <p:cNvPr id="4" name="Foliennummernplatzhalter 3"/>
+          <p:cNvSpPr>
+            <a:spLocks noGrp="1"/>
+          </p:cNvSpPr>
+          <p:nvPr>
+            <p:ph type="sldNum" sz="quarter" idx="5"/>
+          </p:nvPr>
+        </p:nvSpPr>
+        <p:spPr/>
+        <p:txBody>
+          <a:bodyPr/>
+          <a:lstStyle/>
+          <a:p>
+            <a:fld id="{18182567-388C-4D33-8B7B-A651F195F118}" type="slidenum">
+              <a:rPr lang="de-DE" altLang="de-DE" smtClean="0"/>
+              <a:pPr/>
+              <a:t>11</a:t>
+            </a:fld>
+            <a:endParaRPr lang="de-DE" altLang="de-DE"/>
+          </a:p>
+        </p:txBody>
+      </p:sp>
+    </p:spTree>
+    <p:extLst>
+      <p:ext uri="{BB962C8B-B14F-4D97-AF65-F5344CB8AC3E}">
+        <p14:creationId xmlns:p14="http://schemas.microsoft.com/office/powerpoint/2010/main" val="1251104072"/>
+      </p:ext>
+    </p:extLst>
+  </p:cSld>
+  <p:clrMapOvr>
+    <a:masterClrMapping/>
+  </p:clrMapOvr>
+</p:notes>
+</file>
+
+<file path=ppt/notesSlides/notesSlide11.xml><?xml version="1.0" encoding="utf-8"?>
+<p:notes xmlns:a="http://schemas.openxmlformats.org/drawingml/2006/main" xmlns:r="http://schemas.openxmlformats.org/officeDocument/2006/relationships" xmlns:p="http://schemas.openxmlformats.org/presentationml/2006/main">
+  <p:cSld>
+    <p:spTree>
+      <p:nvGrpSpPr>
+        <p:cNvPr id="1" name=""/>
+        <p:cNvGrpSpPr/>
+        <p:nvPr/>
+      </p:nvGrpSpPr>
+      <p:grpSpPr>
+        <a:xfrm>
+          <a:off x="0" y="0"/>
+          <a:ext cx="0" cy="0"/>
+          <a:chOff x="0" y="0"/>
+          <a:chExt cx="0" cy="0"/>
+        </a:xfrm>
+      </p:grpSpPr>
+      <p:sp>
+        <p:nvSpPr>
+          <p:cNvPr id="2" name="Folienbildplatzhalter 1"/>
+          <p:cNvSpPr>
+            <a:spLocks noGrp="1" noRot="1" noChangeAspect="1"/>
+          </p:cNvSpPr>
+          <p:nvPr>
+            <p:ph type="sldImg"/>
+          </p:nvPr>
+        </p:nvSpPr>
+        <p:spPr/>
+      </p:sp>
+      <p:sp>
+        <p:nvSpPr>
+          <p:cNvPr id="3" name="Notizenplatzhalter 2"/>
+          <p:cNvSpPr>
+            <a:spLocks noGrp="1"/>
+          </p:cNvSpPr>
+          <p:nvPr>
+            <p:ph type="body" idx="1"/>
+          </p:nvPr>
+        </p:nvSpPr>
+        <p:spPr/>
+        <p:txBody>
+          <a:bodyPr/>
+          <a:lstStyle/>
+          <a:p>
+            <a:r>
+              <a:rPr lang="de-DE" dirty="0"/>
+              <a:t>Das eigentliche Update muss separat stattfinden</a:t>
+            </a:r>
+            <a:br>
+              <a:rPr lang="de-DE" dirty="0"/>
+            </a:br>
+            <a:r>
+              <a:rPr lang="de-DE" dirty="0"/>
+              <a:t>Beeinflusst weder User noch das Altsystem</a:t>
+            </a:r>
+            <a:br>
+              <a:rPr lang="de-DE" dirty="0"/>
+            </a:br>
+            <a:r>
+              <a:rPr lang="de-DE" dirty="0"/>
+              <a:t>Kann mit Blue-Green </a:t>
+            </a:r>
+            <a:r>
+              <a:rPr lang="de-DE" dirty="0" err="1"/>
+              <a:t>order</a:t>
+            </a:r>
+            <a:r>
+              <a:rPr lang="de-DE" dirty="0"/>
+              <a:t> </a:t>
+            </a:r>
+            <a:r>
+              <a:rPr lang="de-DE" dirty="0" err="1"/>
+              <a:t>Red</a:t>
+            </a:r>
+            <a:r>
+              <a:rPr lang="de-DE" dirty="0"/>
+              <a:t>-Black </a:t>
+            </a:r>
+            <a:r>
+              <a:rPr lang="de-DE" dirty="0" err="1"/>
+              <a:t>Deployment</a:t>
+            </a:r>
+            <a:r>
+              <a:rPr lang="de-DE" dirty="0"/>
+              <a:t> kombiniert werden.</a:t>
+            </a:r>
+          </a:p>
+        </p:txBody>
+      </p:sp>
+      <p:sp>
+        <p:nvSpPr>
+          <p:cNvPr id="4" name="Foliennummernplatzhalter 3"/>
+          <p:cNvSpPr>
+            <a:spLocks noGrp="1"/>
+          </p:cNvSpPr>
+          <p:nvPr>
+            <p:ph type="sldNum" sz="quarter" idx="5"/>
+          </p:nvPr>
+        </p:nvSpPr>
+        <p:spPr/>
+        <p:txBody>
+          <a:bodyPr/>
+          <a:lstStyle/>
+          <a:p>
+            <a:fld id="{18182567-388C-4D33-8B7B-A651F195F118}" type="slidenum">
+              <a:rPr lang="de-DE" altLang="de-DE" smtClean="0"/>
+              <a:pPr/>
+              <a:t>12</a:t>
+            </a:fld>
+            <a:endParaRPr lang="de-DE" altLang="de-DE"/>
+          </a:p>
+        </p:txBody>
+      </p:sp>
+    </p:spTree>
+    <p:extLst>
+      <p:ext uri="{BB962C8B-B14F-4D97-AF65-F5344CB8AC3E}">
+        <p14:creationId xmlns:p14="http://schemas.microsoft.com/office/powerpoint/2010/main" val="1437921376"/>
+      </p:ext>
+    </p:extLst>
+  </p:cSld>
+  <p:clrMapOvr>
+    <a:masterClrMapping/>
+  </p:clrMapOvr>
+</p:notes>
+</file>
+
+<file path=ppt/notesSlides/notesSlide2.xml><?xml version="1.0" encoding="utf-8"?>
+<p:notes xmlns:a="http://schemas.openxmlformats.org/drawingml/2006/main" xmlns:r="http://schemas.openxmlformats.org/officeDocument/2006/relationships" xmlns:p="http://schemas.openxmlformats.org/presentationml/2006/main">
+  <p:cSld>
+    <p:spTree>
+      <p:nvGrpSpPr>
+        <p:cNvPr id="1" name=""/>
+        <p:cNvGrpSpPr/>
+        <p:nvPr/>
+      </p:nvGrpSpPr>
+      <p:grpSpPr>
+        <a:xfrm>
+          <a:off x="0" y="0"/>
+          <a:ext cx="0" cy="0"/>
+          <a:chOff x="0" y="0"/>
+          <a:chExt cx="0" cy="0"/>
+        </a:xfrm>
+      </p:grpSpPr>
+      <p:sp>
+        <p:nvSpPr>
+          <p:cNvPr id="2" name="Folienbildplatzhalter 1"/>
+          <p:cNvSpPr>
+            <a:spLocks noGrp="1" noRot="1" noChangeAspect="1"/>
+          </p:cNvSpPr>
+          <p:nvPr>
+            <p:ph type="sldImg"/>
+          </p:nvPr>
+        </p:nvSpPr>
+        <p:spPr/>
+      </p:sp>
+      <p:sp>
+        <p:nvSpPr>
+          <p:cNvPr id="3" name="Notizenplatzhalter 2"/>
+          <p:cNvSpPr>
+            <a:spLocks noGrp="1"/>
+          </p:cNvSpPr>
+          <p:nvPr>
+            <p:ph type="body" idx="1"/>
+          </p:nvPr>
+        </p:nvSpPr>
+        <p:spPr/>
+        <p:txBody>
+          <a:bodyPr/>
+          <a:lstStyle/>
+          <a:p>
+            <a:r>
+              <a:rPr lang="de-DE" dirty="0"/>
+              <a:t>Liste an Strategien die kurz Angesehen werden</a:t>
+            </a:r>
+          </a:p>
+        </p:txBody>
+      </p:sp>
+      <p:sp>
+        <p:nvSpPr>
+          <p:cNvPr id="4" name="Foliennummernplatzhalter 3"/>
+          <p:cNvSpPr>
+            <a:spLocks noGrp="1"/>
+          </p:cNvSpPr>
+          <p:nvPr>
+            <p:ph type="sldNum" sz="quarter" idx="5"/>
+          </p:nvPr>
+        </p:nvSpPr>
+        <p:spPr/>
+        <p:txBody>
+          <a:bodyPr/>
+          <a:lstStyle/>
+          <a:p>
+            <a:fld id="{18182567-388C-4D33-8B7B-A651F195F118}" type="slidenum">
+              <a:rPr lang="de-DE" altLang="de-DE" smtClean="0"/>
+              <a:pPr/>
+              <a:t>3</a:t>
+            </a:fld>
+            <a:endParaRPr lang="de-DE" altLang="de-DE"/>
+          </a:p>
+        </p:txBody>
+      </p:sp>
+    </p:spTree>
+    <p:extLst>
+      <p:ext uri="{BB962C8B-B14F-4D97-AF65-F5344CB8AC3E}">
+        <p14:creationId xmlns:p14="http://schemas.microsoft.com/office/powerpoint/2010/main" val="3043190696"/>
+      </p:ext>
+    </p:extLst>
+  </p:cSld>
+  <p:clrMapOvr>
+    <a:masterClrMapping/>
+  </p:clrMapOvr>
+</p:notes>
+</file>
+
+<file path=ppt/notesSlides/notesSlide3.xml><?xml version="1.0" encoding="utf-8"?>
+<p:notes xmlns:a="http://schemas.openxmlformats.org/drawingml/2006/main" xmlns:r="http://schemas.openxmlformats.org/officeDocument/2006/relationships" xmlns:p="http://schemas.openxmlformats.org/presentationml/2006/main">
+  <p:cSld>
+    <p:spTree>
+      <p:nvGrpSpPr>
+        <p:cNvPr id="1" name=""/>
+        <p:cNvGrpSpPr/>
+        <p:nvPr/>
+      </p:nvGrpSpPr>
+      <p:grpSpPr>
+        <a:xfrm>
+          <a:off x="0" y="0"/>
+          <a:ext cx="0" cy="0"/>
+          <a:chOff x="0" y="0"/>
+          <a:chExt cx="0" cy="0"/>
+        </a:xfrm>
+      </p:grpSpPr>
+      <p:sp>
+        <p:nvSpPr>
+          <p:cNvPr id="2" name="Folienbildplatzhalter 1"/>
+          <p:cNvSpPr>
+            <a:spLocks noGrp="1" noRot="1" noChangeAspect="1"/>
+          </p:cNvSpPr>
+          <p:nvPr>
+            <p:ph type="sldImg"/>
+          </p:nvPr>
+        </p:nvSpPr>
+        <p:spPr/>
+      </p:sp>
+      <p:sp>
+        <p:nvSpPr>
+          <p:cNvPr id="3" name="Notizenplatzhalter 2"/>
+          <p:cNvSpPr>
+            <a:spLocks noGrp="1"/>
+          </p:cNvSpPr>
+          <p:nvPr>
+            <p:ph type="body" idx="1"/>
+          </p:nvPr>
+        </p:nvSpPr>
+        <p:spPr/>
+        <p:txBody>
+          <a:bodyPr/>
+          <a:lstStyle/>
+          <a:p>
+            <a:r>
+              <a:rPr lang="de-DE" dirty="0"/>
+              <a:t>Einfachster deploy</a:t>
+            </a:r>
+            <a:br>
+              <a:rPr lang="de-DE" dirty="0"/>
+            </a:br>
+            <a:r>
+              <a:rPr lang="de-DE" dirty="0"/>
+              <a:t>Rollback wäre das komplette update rückwärts </a:t>
+            </a:r>
+          </a:p>
+        </p:txBody>
+      </p:sp>
+      <p:sp>
+        <p:nvSpPr>
+          <p:cNvPr id="4" name="Foliennummernplatzhalter 3"/>
+          <p:cNvSpPr>
+            <a:spLocks noGrp="1"/>
+          </p:cNvSpPr>
+          <p:nvPr>
+            <p:ph type="sldNum" sz="quarter" idx="5"/>
+          </p:nvPr>
+        </p:nvSpPr>
+        <p:spPr/>
+        <p:txBody>
+          <a:bodyPr/>
+          <a:lstStyle/>
+          <a:p>
+            <a:fld id="{18182567-388C-4D33-8B7B-A651F195F118}" type="slidenum">
+              <a:rPr lang="de-DE" altLang="de-DE" smtClean="0"/>
+              <a:pPr/>
+              <a:t>4</a:t>
+            </a:fld>
+            <a:endParaRPr lang="de-DE" altLang="de-DE"/>
+          </a:p>
+        </p:txBody>
+      </p:sp>
+    </p:spTree>
+    <p:extLst>
+      <p:ext uri="{BB962C8B-B14F-4D97-AF65-F5344CB8AC3E}">
+        <p14:creationId xmlns:p14="http://schemas.microsoft.com/office/powerpoint/2010/main" val="3921781153"/>
+      </p:ext>
+    </p:extLst>
+  </p:cSld>
+  <p:clrMapOvr>
+    <a:masterClrMapping/>
+  </p:clrMapOvr>
+</p:notes>
+</file>
+
+<file path=ppt/notesSlides/notesSlide4.xml><?xml version="1.0" encoding="utf-8"?>
+<p:notes xmlns:a="http://schemas.openxmlformats.org/drawingml/2006/main" xmlns:r="http://schemas.openxmlformats.org/officeDocument/2006/relationships" xmlns:p="http://schemas.openxmlformats.org/presentationml/2006/main">
+  <p:cSld>
+    <p:spTree>
+      <p:nvGrpSpPr>
+        <p:cNvPr id="1" name=""/>
+        <p:cNvGrpSpPr/>
+        <p:nvPr/>
+      </p:nvGrpSpPr>
+      <p:grpSpPr>
+        <a:xfrm>
+          <a:off x="0" y="0"/>
+          <a:ext cx="0" cy="0"/>
+          <a:chOff x="0" y="0"/>
+          <a:chExt cx="0" cy="0"/>
+        </a:xfrm>
+      </p:grpSpPr>
+      <p:sp>
+        <p:nvSpPr>
+          <p:cNvPr id="2" name="Folienbildplatzhalter 1"/>
+          <p:cNvSpPr>
+            <a:spLocks noGrp="1" noRot="1" noChangeAspect="1"/>
+          </p:cNvSpPr>
+          <p:nvPr>
+            <p:ph type="sldImg"/>
+          </p:nvPr>
+        </p:nvSpPr>
+        <p:spPr/>
+      </p:sp>
+      <p:sp>
+        <p:nvSpPr>
+          <p:cNvPr id="3" name="Notizenplatzhalter 2"/>
+          <p:cNvSpPr>
+            <a:spLocks noGrp="1"/>
+          </p:cNvSpPr>
+          <p:nvPr>
+            <p:ph type="body" idx="1"/>
+          </p:nvPr>
+        </p:nvSpPr>
+        <p:spPr/>
+        <p:txBody>
+          <a:bodyPr/>
+          <a:lstStyle/>
+          <a:p>
+            <a:r>
+              <a:rPr lang="de-DE" dirty="0"/>
+              <a:t>Nur ein Server</a:t>
+            </a:r>
+            <a:br>
+              <a:rPr lang="de-DE" dirty="0"/>
+            </a:br>
+            <a:r>
+              <a:rPr lang="de-DE" dirty="0"/>
+              <a:t>Rollback dauert so lange wie das Update selbst</a:t>
+            </a:r>
+            <a:br>
+              <a:rPr lang="de-DE" dirty="0"/>
+            </a:br>
+            <a:r>
+              <a:rPr lang="de-DE" dirty="0"/>
+              <a:t>Rollback hat ebenfalls Downtime</a:t>
+            </a:r>
+          </a:p>
+        </p:txBody>
+      </p:sp>
+      <p:sp>
+        <p:nvSpPr>
+          <p:cNvPr id="4" name="Foliennummernplatzhalter 3"/>
+          <p:cNvSpPr>
+            <a:spLocks noGrp="1"/>
+          </p:cNvSpPr>
+          <p:nvPr>
+            <p:ph type="sldNum" sz="quarter" idx="5"/>
+          </p:nvPr>
+        </p:nvSpPr>
+        <p:spPr/>
+        <p:txBody>
+          <a:bodyPr/>
+          <a:lstStyle/>
+          <a:p>
+            <a:fld id="{18182567-388C-4D33-8B7B-A651F195F118}" type="slidenum">
+              <a:rPr lang="de-DE" altLang="de-DE" smtClean="0"/>
+              <a:pPr/>
+              <a:t>5</a:t>
+            </a:fld>
+            <a:endParaRPr lang="de-DE" altLang="de-DE"/>
+          </a:p>
+        </p:txBody>
+      </p:sp>
+    </p:spTree>
+    <p:extLst>
+      <p:ext uri="{BB962C8B-B14F-4D97-AF65-F5344CB8AC3E}">
+        <p14:creationId xmlns:p14="http://schemas.microsoft.com/office/powerpoint/2010/main" val="1227724863"/>
+      </p:ext>
+    </p:extLst>
+  </p:cSld>
+  <p:clrMapOvr>
+    <a:masterClrMapping/>
+  </p:clrMapOvr>
+</p:notes>
+</file>
+
+<file path=ppt/notesSlides/notesSlide5.xml><?xml version="1.0" encoding="utf-8"?>
+<p:notes xmlns:a="http://schemas.openxmlformats.org/drawingml/2006/main" xmlns:r="http://schemas.openxmlformats.org/officeDocument/2006/relationships" xmlns:p="http://schemas.openxmlformats.org/presentationml/2006/main">
+  <p:cSld>
+    <p:spTree>
+      <p:nvGrpSpPr>
+        <p:cNvPr id="1" name=""/>
+        <p:cNvGrpSpPr/>
+        <p:nvPr/>
+      </p:nvGrpSpPr>
+      <p:grpSpPr>
+        <a:xfrm>
+          <a:off x="0" y="0"/>
+          <a:ext cx="0" cy="0"/>
+          <a:chOff x="0" y="0"/>
+          <a:chExt cx="0" cy="0"/>
+        </a:xfrm>
+      </p:grpSpPr>
+      <p:sp>
+        <p:nvSpPr>
+          <p:cNvPr id="2" name="Folienbildplatzhalter 1"/>
+          <p:cNvSpPr>
+            <a:spLocks noGrp="1" noRot="1" noChangeAspect="1"/>
+          </p:cNvSpPr>
+          <p:nvPr>
+            <p:ph type="sldImg"/>
+          </p:nvPr>
+        </p:nvSpPr>
+        <p:spPr/>
+      </p:sp>
+      <p:sp>
+        <p:nvSpPr>
+          <p:cNvPr id="3" name="Notizenplatzhalter 2"/>
+          <p:cNvSpPr>
+            <a:spLocks noGrp="1"/>
+          </p:cNvSpPr>
+          <p:nvPr>
+            <p:ph type="body" idx="1"/>
+          </p:nvPr>
+        </p:nvSpPr>
+        <p:spPr/>
+        <p:txBody>
+          <a:bodyPr/>
+          <a:lstStyle/>
+          <a:p>
+            <a:r>
+              <a:rPr lang="de-DE" dirty="0"/>
+              <a:t>Pro Anfrage wird zufällig alt oder neu gewählt mit bestimmter Gewichtung.</a:t>
+            </a:r>
+          </a:p>
+          <a:p>
+            <a:r>
+              <a:rPr lang="de-DE" dirty="0"/>
+              <a:t>Altsystem (</a:t>
+            </a:r>
+            <a:r>
+              <a:rPr lang="de-DE" dirty="0" err="1"/>
+              <a:t>blue</a:t>
+            </a:r>
+            <a:r>
+              <a:rPr lang="de-DE" dirty="0"/>
+              <a:t>) kann bei nächstem update als Neusystem benutzt werden</a:t>
+            </a:r>
+          </a:p>
+        </p:txBody>
+      </p:sp>
+      <p:sp>
+        <p:nvSpPr>
+          <p:cNvPr id="4" name="Foliennummernplatzhalter 3"/>
+          <p:cNvSpPr>
+            <a:spLocks noGrp="1"/>
+          </p:cNvSpPr>
+          <p:nvPr>
+            <p:ph type="sldNum" sz="quarter" idx="5"/>
+          </p:nvPr>
+        </p:nvSpPr>
+        <p:spPr/>
+        <p:txBody>
+          <a:bodyPr/>
+          <a:lstStyle/>
+          <a:p>
+            <a:fld id="{18182567-388C-4D33-8B7B-A651F195F118}" type="slidenum">
+              <a:rPr lang="de-DE" altLang="de-DE" smtClean="0"/>
+              <a:pPr/>
+              <a:t>6</a:t>
+            </a:fld>
+            <a:endParaRPr lang="de-DE" altLang="de-DE"/>
+          </a:p>
+        </p:txBody>
+      </p:sp>
+    </p:spTree>
+    <p:extLst>
+      <p:ext uri="{BB962C8B-B14F-4D97-AF65-F5344CB8AC3E}">
+        <p14:creationId xmlns:p14="http://schemas.microsoft.com/office/powerpoint/2010/main" val="17587249"/>
+      </p:ext>
+    </p:extLst>
+  </p:cSld>
+  <p:clrMapOvr>
+    <a:masterClrMapping/>
+  </p:clrMapOvr>
+</p:notes>
+</file>
+
+<file path=ppt/notesSlides/notesSlide6.xml><?xml version="1.0" encoding="utf-8"?>
+<p:notes xmlns:a="http://schemas.openxmlformats.org/drawingml/2006/main" xmlns:r="http://schemas.openxmlformats.org/officeDocument/2006/relationships" xmlns:p="http://schemas.openxmlformats.org/presentationml/2006/main">
+  <p:cSld>
+    <p:spTree>
+      <p:nvGrpSpPr>
+        <p:cNvPr id="1" name=""/>
+        <p:cNvGrpSpPr/>
+        <p:nvPr/>
+      </p:nvGrpSpPr>
+      <p:grpSpPr>
+        <a:xfrm>
+          <a:off x="0" y="0"/>
+          <a:ext cx="0" cy="0"/>
+          <a:chOff x="0" y="0"/>
+          <a:chExt cx="0" cy="0"/>
+        </a:xfrm>
+      </p:grpSpPr>
+      <p:sp>
+        <p:nvSpPr>
+          <p:cNvPr id="2" name="Folienbildplatzhalter 1"/>
+          <p:cNvSpPr>
+            <a:spLocks noGrp="1" noRot="1" noChangeAspect="1"/>
+          </p:cNvSpPr>
+          <p:nvPr>
+            <p:ph type="sldImg"/>
+          </p:nvPr>
+        </p:nvSpPr>
+        <p:spPr/>
+      </p:sp>
+      <p:sp>
+        <p:nvSpPr>
+          <p:cNvPr id="3" name="Notizenplatzhalter 2"/>
+          <p:cNvSpPr>
+            <a:spLocks noGrp="1"/>
+          </p:cNvSpPr>
+          <p:nvPr>
+            <p:ph type="body" idx="1"/>
+          </p:nvPr>
+        </p:nvSpPr>
+        <p:spPr/>
+        <p:txBody>
+          <a:bodyPr/>
+          <a:lstStyle/>
+          <a:p>
+            <a:r>
+              <a:rPr lang="de-DE" dirty="0"/>
+              <a:t>Rollback ist nur Einstellung des Load-Balancers</a:t>
+            </a:r>
+          </a:p>
+          <a:p>
+            <a:r>
+              <a:rPr lang="de-DE" dirty="0"/>
+              <a:t>Keine feste Testgruppe</a:t>
+            </a:r>
+          </a:p>
+          <a:p>
+            <a:r>
+              <a:rPr lang="de-DE" dirty="0"/>
+              <a:t>2 Server</a:t>
+            </a:r>
+          </a:p>
+        </p:txBody>
+      </p:sp>
+      <p:sp>
+        <p:nvSpPr>
+          <p:cNvPr id="4" name="Foliennummernplatzhalter 3"/>
+          <p:cNvSpPr>
+            <a:spLocks noGrp="1"/>
+          </p:cNvSpPr>
+          <p:nvPr>
+            <p:ph type="sldNum" sz="quarter" idx="5"/>
+          </p:nvPr>
+        </p:nvSpPr>
+        <p:spPr/>
+        <p:txBody>
+          <a:bodyPr/>
+          <a:lstStyle/>
+          <a:p>
+            <a:fld id="{18182567-388C-4D33-8B7B-A651F195F118}" type="slidenum">
+              <a:rPr lang="de-DE" altLang="de-DE" smtClean="0"/>
+              <a:pPr/>
+              <a:t>7</a:t>
+            </a:fld>
+            <a:endParaRPr lang="de-DE" altLang="de-DE"/>
+          </a:p>
+        </p:txBody>
+      </p:sp>
+    </p:spTree>
+    <p:extLst>
+      <p:ext uri="{BB962C8B-B14F-4D97-AF65-F5344CB8AC3E}">
+        <p14:creationId xmlns:p14="http://schemas.microsoft.com/office/powerpoint/2010/main" val="1076930107"/>
+      </p:ext>
+    </p:extLst>
+  </p:cSld>
+  <p:clrMapOvr>
+    <a:masterClrMapping/>
+  </p:clrMapOvr>
+</p:notes>
+</file>
+
+<file path=ppt/notesSlides/notesSlide7.xml><?xml version="1.0" encoding="utf-8"?>
+<p:notes xmlns:a="http://schemas.openxmlformats.org/drawingml/2006/main" xmlns:r="http://schemas.openxmlformats.org/officeDocument/2006/relationships" xmlns:p="http://schemas.openxmlformats.org/presentationml/2006/main">
+  <p:cSld>
+    <p:spTree>
+      <p:nvGrpSpPr>
+        <p:cNvPr id="1" name=""/>
+        <p:cNvGrpSpPr/>
+        <p:nvPr/>
+      </p:nvGrpSpPr>
+      <p:grpSpPr>
+        <a:xfrm>
+          <a:off x="0" y="0"/>
+          <a:ext cx="0" cy="0"/>
+          <a:chOff x="0" y="0"/>
+          <a:chExt cx="0" cy="0"/>
+        </a:xfrm>
+      </p:grpSpPr>
+      <p:sp>
+        <p:nvSpPr>
+          <p:cNvPr id="2" name="Folienbildplatzhalter 1"/>
+          <p:cNvSpPr>
+            <a:spLocks noGrp="1" noRot="1" noChangeAspect="1"/>
+          </p:cNvSpPr>
+          <p:nvPr>
+            <p:ph type="sldImg"/>
+          </p:nvPr>
+        </p:nvSpPr>
+        <p:spPr/>
+      </p:sp>
+      <p:sp>
+        <p:nvSpPr>
+          <p:cNvPr id="3" name="Notizenplatzhalter 2"/>
+          <p:cNvSpPr>
+            <a:spLocks noGrp="1"/>
+          </p:cNvSpPr>
+          <p:nvPr>
+            <p:ph type="body" idx="1"/>
+          </p:nvPr>
+        </p:nvSpPr>
+        <p:spPr/>
+        <p:txBody>
+          <a:bodyPr/>
+          <a:lstStyle/>
+          <a:p>
+            <a:endParaRPr lang="de-DE" dirty="0"/>
+          </a:p>
+        </p:txBody>
+      </p:sp>
+      <p:sp>
+        <p:nvSpPr>
+          <p:cNvPr id="4" name="Foliennummernplatzhalter 3"/>
+          <p:cNvSpPr>
+            <a:spLocks noGrp="1"/>
+          </p:cNvSpPr>
+          <p:nvPr>
+            <p:ph type="sldNum" sz="quarter" idx="5"/>
+          </p:nvPr>
+        </p:nvSpPr>
+        <p:spPr/>
+        <p:txBody>
+          <a:bodyPr/>
+          <a:lstStyle/>
+          <a:p>
+            <a:fld id="{18182567-388C-4D33-8B7B-A651F195F118}" type="slidenum">
+              <a:rPr lang="de-DE" altLang="de-DE" smtClean="0"/>
+              <a:pPr/>
+              <a:t>8</a:t>
+            </a:fld>
+            <a:endParaRPr lang="de-DE" altLang="de-DE"/>
+          </a:p>
+        </p:txBody>
+      </p:sp>
+    </p:spTree>
+    <p:extLst>
+      <p:ext uri="{BB962C8B-B14F-4D97-AF65-F5344CB8AC3E}">
+        <p14:creationId xmlns:p14="http://schemas.microsoft.com/office/powerpoint/2010/main" val="1711605960"/>
+      </p:ext>
+    </p:extLst>
+  </p:cSld>
+  <p:clrMapOvr>
+    <a:masterClrMapping/>
+  </p:clrMapOvr>
+</p:notes>
+</file>
+
+<file path=ppt/notesSlides/notesSlide8.xml><?xml version="1.0" encoding="utf-8"?>
+<p:notes xmlns:a="http://schemas.openxmlformats.org/drawingml/2006/main" xmlns:r="http://schemas.openxmlformats.org/officeDocument/2006/relationships" xmlns:p="http://schemas.openxmlformats.org/presentationml/2006/main">
+  <p:cSld>
+    <p:spTree>
+      <p:nvGrpSpPr>
+        <p:cNvPr id="1" name=""/>
+        <p:cNvGrpSpPr/>
+        <p:nvPr/>
+      </p:nvGrpSpPr>
+      <p:grpSpPr>
+        <a:xfrm>
+          <a:off x="0" y="0"/>
+          <a:ext cx="0" cy="0"/>
+          <a:chOff x="0" y="0"/>
+          <a:chExt cx="0" cy="0"/>
+        </a:xfrm>
+      </p:grpSpPr>
+      <p:sp>
+        <p:nvSpPr>
+          <p:cNvPr id="2" name="Folienbildplatzhalter 1"/>
+          <p:cNvSpPr>
+            <a:spLocks noGrp="1" noRot="1" noChangeAspect="1"/>
+          </p:cNvSpPr>
+          <p:nvPr>
+            <p:ph type="sldImg"/>
+          </p:nvPr>
+        </p:nvSpPr>
+        <p:spPr/>
+      </p:sp>
+      <p:sp>
+        <p:nvSpPr>
+          <p:cNvPr id="3" name="Notizenplatzhalter 2"/>
+          <p:cNvSpPr>
+            <a:spLocks noGrp="1"/>
+          </p:cNvSpPr>
+          <p:nvPr>
+            <p:ph type="body" idx="1"/>
+          </p:nvPr>
+        </p:nvSpPr>
+        <p:spPr/>
+        <p:txBody>
+          <a:bodyPr/>
+          <a:lstStyle/>
+          <a:p>
+            <a:r>
+              <a:rPr lang="de-DE" dirty="0"/>
+              <a:t>Nützlich wenn man eine feste Testgruppe </a:t>
+            </a:r>
+            <a:r>
+              <a:rPr lang="de-DE" dirty="0" err="1"/>
+              <a:t>hat,s</a:t>
+            </a:r>
+            <a:r>
+              <a:rPr lang="de-DE" dirty="0"/>
+              <a:t> die die neue Version vorab testen soll.</a:t>
+            </a:r>
+          </a:p>
+        </p:txBody>
+      </p:sp>
+      <p:sp>
+        <p:nvSpPr>
+          <p:cNvPr id="4" name="Foliennummernplatzhalter 3"/>
+          <p:cNvSpPr>
+            <a:spLocks noGrp="1"/>
+          </p:cNvSpPr>
+          <p:nvPr>
+            <p:ph type="sldNum" sz="quarter" idx="5"/>
+          </p:nvPr>
+        </p:nvSpPr>
+        <p:spPr/>
+        <p:txBody>
+          <a:bodyPr/>
+          <a:lstStyle/>
+          <a:p>
+            <a:fld id="{18182567-388C-4D33-8B7B-A651F195F118}" type="slidenum">
+              <a:rPr lang="de-DE" altLang="de-DE" smtClean="0"/>
+              <a:pPr/>
+              <a:t>9</a:t>
+            </a:fld>
+            <a:endParaRPr lang="de-DE" altLang="de-DE"/>
+          </a:p>
+        </p:txBody>
+      </p:sp>
+    </p:spTree>
+    <p:extLst>
+      <p:ext uri="{BB962C8B-B14F-4D97-AF65-F5344CB8AC3E}">
+        <p14:creationId xmlns:p14="http://schemas.microsoft.com/office/powerpoint/2010/main" val="2099690642"/>
+      </p:ext>
+    </p:extLst>
+  </p:cSld>
+  <p:clrMapOvr>
+    <a:masterClrMapping/>
+  </p:clrMapOvr>
+</p:notes>
+</file>
+
+<file path=ppt/notesSlides/notesSlide9.xml><?xml version="1.0" encoding="utf-8"?>
+<p:notes xmlns:a="http://schemas.openxmlformats.org/drawingml/2006/main" xmlns:r="http://schemas.openxmlformats.org/officeDocument/2006/relationships" xmlns:p="http://schemas.openxmlformats.org/presentationml/2006/main">
+  <p:cSld>
+    <p:spTree>
+      <p:nvGrpSpPr>
+        <p:cNvPr id="1" name=""/>
+        <p:cNvGrpSpPr/>
+        <p:nvPr/>
+      </p:nvGrpSpPr>
+      <p:grpSpPr>
+        <a:xfrm>
+          <a:off x="0" y="0"/>
+          <a:ext cx="0" cy="0"/>
+          <a:chOff x="0" y="0"/>
+          <a:chExt cx="0" cy="0"/>
+        </a:xfrm>
+      </p:grpSpPr>
+      <p:sp>
+        <p:nvSpPr>
+          <p:cNvPr id="2" name="Folienbildplatzhalter 1"/>
+          <p:cNvSpPr>
+            <a:spLocks noGrp="1" noRot="1" noChangeAspect="1"/>
+          </p:cNvSpPr>
+          <p:nvPr>
+            <p:ph type="sldImg"/>
+          </p:nvPr>
+        </p:nvSpPr>
+        <p:spPr/>
+      </p:sp>
+      <p:sp>
+        <p:nvSpPr>
+          <p:cNvPr id="3" name="Notizenplatzhalter 2"/>
+          <p:cNvSpPr>
+            <a:spLocks noGrp="1"/>
+          </p:cNvSpPr>
+          <p:nvPr>
+            <p:ph type="body" idx="1"/>
+          </p:nvPr>
+        </p:nvSpPr>
+        <p:spPr/>
+        <p:txBody>
+          <a:bodyPr/>
+          <a:lstStyle/>
+          <a:p>
+            <a:r>
+              <a:rPr lang="de-DE" dirty="0"/>
+              <a:t>Nur die Testgruppe ist von einem Rollback während der Testphase betroffen</a:t>
+            </a:r>
+          </a:p>
+        </p:txBody>
+      </p:sp>
+      <p:sp>
+        <p:nvSpPr>
+          <p:cNvPr id="4" name="Foliennummernplatzhalter 3"/>
+          <p:cNvSpPr>
+            <a:spLocks noGrp="1"/>
+          </p:cNvSpPr>
+          <p:nvPr>
+            <p:ph type="sldNum" sz="quarter" idx="5"/>
+          </p:nvPr>
+        </p:nvSpPr>
+        <p:spPr/>
+        <p:txBody>
+          <a:bodyPr/>
+          <a:lstStyle/>
+          <a:p>
+            <a:fld id="{18182567-388C-4D33-8B7B-A651F195F118}" type="slidenum">
+              <a:rPr lang="de-DE" altLang="de-DE" smtClean="0"/>
+              <a:pPr/>
+              <a:t>10</a:t>
+            </a:fld>
+            <a:endParaRPr lang="de-DE" altLang="de-DE"/>
+          </a:p>
+        </p:txBody>
+      </p:sp>
+    </p:spTree>
+    <p:extLst>
+      <p:ext uri="{BB962C8B-B14F-4D97-AF65-F5344CB8AC3E}">
+        <p14:creationId xmlns:p14="http://schemas.microsoft.com/office/powerpoint/2010/main" val="2823913330"/>
+      </p:ext>
+    </p:extLst>
+  </p:cSld>
+  <p:clrMapOvr>
+    <a:masterClrMapping/>
+  </p:clrMapOvr>
+</p:notes>
+</file>
+
 <file path=ppt/slideLayouts/slideLayout1.xml><?xml version="1.0" encoding="utf-8"?>
 <p:sldLayout xmlns:a="http://schemas.openxmlformats.org/drawingml/2006/main" xmlns:r="http://schemas.openxmlformats.org/officeDocument/2006/relationships" xmlns:p="http://schemas.openxmlformats.org/presentationml/2006/main" type="obj" preserve="1">
   <p:cSld name="Titel und Inhalt">
@@ -1300,7 +2386,7 @@
               <a:pPr algn="ctr">
                 <a:defRPr/>
               </a:pPr>
-              <a:t>06.06.2024</a:t>
+              <a:t>07.06.2024</a:t>
             </a:fld>
             <a:endParaRPr lang="de-DE" sz="1000">
               <a:solidFill>
@@ -4929,21 +6015,6 @@
               <a:rPr lang="de-DE" altLang="de-DE" kern="0" dirty="0"/>
               <a:t>Teuer</a:t>
             </a:r>
-          </a:p>
-          <a:p>
-            <a:pPr>
-              <a:buFont typeface="Arial" panose="020B0604020202020204" pitchFamily="34" charset="0"/>
-              <a:buChar char="•"/>
-            </a:pPr>
-            <a:r>
-              <a:rPr lang="de-DE" altLang="de-DE" kern="0" dirty="0"/>
-              <a:t>Nur Test kein Update</a:t>
-            </a:r>
-          </a:p>
-          <a:p>
-            <a:pPr marL="0" indent="0">
-              <a:buNone/>
-            </a:pPr>
             <a:endParaRPr lang="de-DE" b="1" dirty="0"/>
           </a:p>
         </p:txBody>
@@ -5118,7 +6189,7 @@
           <p:nvPr/>
         </p:nvPicPr>
         <p:blipFill>
-          <a:blip r:embed="rId2">
+          <a:blip r:embed="rId3">
             <a:extLst>
               <a:ext uri="{28A0092B-C50C-407E-A947-70E740481C1C}">
                 <a14:useLocalDpi xmlns:a14="http://schemas.microsoft.com/office/drawing/2010/main" val="0"/>
@@ -6775,7 +7846,7 @@
             </a:pPr>
             <a:r>
               <a:rPr lang="de-DE" altLang="de-DE" kern="0" dirty="0"/>
-              <a:t>Kein partieller deploy möglich</a:t>
+              <a:t>Kein partieller Deploy möglich</a:t>
             </a:r>
           </a:p>
         </p:txBody>

</xml_diff>

<commit_message>
Anfang 3-5 Variablen und Secrets
</commit_message>
<xml_diff>
--- a/slides/Tag-3_5-Deployment-Strategien.pptx
+++ b/slides/Tag-3_5-Deployment-Strategien.pptx
@@ -6,10 +6,10 @@
     <p:sldMasterId id="2147483649" r:id="rId2"/>
   </p:sldMasterIdLst>
   <p:notesMasterIdLst>
-    <p:notesMasterId r:id="rId18"/>
+    <p:notesMasterId r:id="rId23"/>
   </p:notesMasterIdLst>
   <p:handoutMasterIdLst>
-    <p:handoutMasterId r:id="rId19"/>
+    <p:handoutMasterId r:id="rId24"/>
   </p:handoutMasterIdLst>
   <p:sldIdLst>
     <p:sldId id="624" r:id="rId3"/>
@@ -27,6 +27,11 @@
     <p:sldId id="303" r:id="rId15"/>
     <p:sldId id="299" r:id="rId16"/>
     <p:sldId id="304" r:id="rId17"/>
+    <p:sldId id="628" r:id="rId18"/>
+    <p:sldId id="629" r:id="rId19"/>
+    <p:sldId id="631" r:id="rId20"/>
+    <p:sldId id="630" r:id="rId21"/>
+    <p:sldId id="632" r:id="rId22"/>
   </p:sldIdLst>
   <p:sldSz cx="9144000" cy="6858000" type="screen4x3"/>
   <p:notesSz cx="6784975" cy="9921875"/>
@@ -175,6 +180,11 @@
             <p14:sldId id="303"/>
             <p14:sldId id="299"/>
             <p14:sldId id="304"/>
+            <p14:sldId id="628"/>
+            <p14:sldId id="629"/>
+            <p14:sldId id="631"/>
+            <p14:sldId id="630"/>
+            <p14:sldId id="632"/>
           </p14:sldIdLst>
         </p14:section>
       </p14:sectionLst>
@@ -1349,6 +1359,230 @@
     <p:extLst>
       <p:ext uri="{BB962C8B-B14F-4D97-AF65-F5344CB8AC3E}">
         <p14:creationId xmlns:p14="http://schemas.microsoft.com/office/powerpoint/2010/main" val="1437921376"/>
+      </p:ext>
+    </p:extLst>
+  </p:cSld>
+  <p:clrMapOvr>
+    <a:masterClrMapping/>
+  </p:clrMapOvr>
+</p:notes>
+</file>
+
+<file path=ppt/notesSlides/notesSlide13.xml><?xml version="1.0" encoding="utf-8"?>
+<p:notes xmlns:a="http://schemas.openxmlformats.org/drawingml/2006/main" xmlns:r="http://schemas.openxmlformats.org/officeDocument/2006/relationships" xmlns:p="http://schemas.openxmlformats.org/presentationml/2006/main">
+  <p:cSld>
+    <p:spTree>
+      <p:nvGrpSpPr>
+        <p:cNvPr id="1" name=""/>
+        <p:cNvGrpSpPr/>
+        <p:nvPr/>
+      </p:nvGrpSpPr>
+      <p:grpSpPr>
+        <a:xfrm>
+          <a:off x="0" y="0"/>
+          <a:ext cx="0" cy="0"/>
+          <a:chOff x="0" y="0"/>
+          <a:chExt cx="0" cy="0"/>
+        </a:xfrm>
+      </p:grpSpPr>
+      <p:sp>
+        <p:nvSpPr>
+          <p:cNvPr id="2" name="Folienbildplatzhalter 1"/>
+          <p:cNvSpPr>
+            <a:spLocks noGrp="1" noRot="1" noChangeAspect="1"/>
+          </p:cNvSpPr>
+          <p:nvPr>
+            <p:ph type="sldImg"/>
+          </p:nvPr>
+        </p:nvSpPr>
+        <p:spPr/>
+      </p:sp>
+      <p:sp>
+        <p:nvSpPr>
+          <p:cNvPr id="3" name="Notizenplatzhalter 2"/>
+          <p:cNvSpPr>
+            <a:spLocks noGrp="1"/>
+          </p:cNvSpPr>
+          <p:nvPr>
+            <p:ph type="body" idx="1"/>
+          </p:nvPr>
+        </p:nvSpPr>
+        <p:spPr/>
+        <p:txBody>
+          <a:bodyPr/>
+          <a:lstStyle/>
+          <a:p>
+            <a:r>
+              <a:rPr lang="de-DE" dirty="0"/>
+              <a:t>Bild ist urheberrechtslos von Unsplash.com</a:t>
+            </a:r>
+          </a:p>
+        </p:txBody>
+      </p:sp>
+      <p:sp>
+        <p:nvSpPr>
+          <p:cNvPr id="4" name="Foliennummernplatzhalter 3"/>
+          <p:cNvSpPr>
+            <a:spLocks noGrp="1"/>
+          </p:cNvSpPr>
+          <p:nvPr>
+            <p:ph type="sldNum" sz="quarter" idx="5"/>
+          </p:nvPr>
+        </p:nvSpPr>
+        <p:spPr/>
+        <p:txBody>
+          <a:bodyPr/>
+          <a:lstStyle/>
+          <a:p>
+            <a:fld id="{18182567-388C-4D33-8B7B-A651F195F118}" type="slidenum">
+              <a:rPr lang="de-DE" altLang="de-DE" smtClean="0"/>
+              <a:pPr/>
+              <a:t>16</a:t>
+            </a:fld>
+            <a:endParaRPr lang="de-DE" altLang="de-DE"/>
+          </a:p>
+        </p:txBody>
+      </p:sp>
+    </p:spTree>
+    <p:extLst>
+      <p:ext uri="{BB962C8B-B14F-4D97-AF65-F5344CB8AC3E}">
+        <p14:creationId xmlns:p14="http://schemas.microsoft.com/office/powerpoint/2010/main" val="2503989314"/>
+      </p:ext>
+    </p:extLst>
+  </p:cSld>
+  <p:clrMapOvr>
+    <a:masterClrMapping/>
+  </p:clrMapOvr>
+</p:notes>
+</file>
+
+<file path=ppt/notesSlides/notesSlide14.xml><?xml version="1.0" encoding="utf-8"?>
+<p:notes xmlns:a="http://schemas.openxmlformats.org/drawingml/2006/main" xmlns:r="http://schemas.openxmlformats.org/officeDocument/2006/relationships" xmlns:p="http://schemas.openxmlformats.org/presentationml/2006/main">
+  <p:cSld>
+    <p:spTree>
+      <p:nvGrpSpPr>
+        <p:cNvPr id="1" name=""/>
+        <p:cNvGrpSpPr/>
+        <p:nvPr/>
+      </p:nvGrpSpPr>
+      <p:grpSpPr>
+        <a:xfrm>
+          <a:off x="0" y="0"/>
+          <a:ext cx="0" cy="0"/>
+          <a:chOff x="0" y="0"/>
+          <a:chExt cx="0" cy="0"/>
+        </a:xfrm>
+      </p:grpSpPr>
+      <p:sp>
+        <p:nvSpPr>
+          <p:cNvPr id="2" name="Folienbildplatzhalter 1"/>
+          <p:cNvSpPr>
+            <a:spLocks noGrp="1" noRot="1" noChangeAspect="1"/>
+          </p:cNvSpPr>
+          <p:nvPr>
+            <p:ph type="sldImg"/>
+          </p:nvPr>
+        </p:nvSpPr>
+        <p:spPr/>
+      </p:sp>
+      <p:sp>
+        <p:nvSpPr>
+          <p:cNvPr id="3" name="Notizenplatzhalter 2"/>
+          <p:cNvSpPr>
+            <a:spLocks noGrp="1"/>
+          </p:cNvSpPr>
+          <p:nvPr>
+            <p:ph type="body" idx="1"/>
+          </p:nvPr>
+        </p:nvSpPr>
+        <p:spPr/>
+        <p:txBody>
+          <a:bodyPr/>
+          <a:lstStyle/>
+          <a:p>
+            <a:r>
+              <a:rPr lang="en-US" dirty="0"/>
+              <a:t>Visible </a:t>
+            </a:r>
+            <a:r>
+              <a:rPr lang="en-US" dirty="0" err="1"/>
+              <a:t>hei</a:t>
+            </a:r>
+            <a:r>
+              <a:rPr lang="de-DE" dirty="0" err="1"/>
+              <a:t>ßt</a:t>
+            </a:r>
+            <a:r>
+              <a:rPr lang="de-DE" dirty="0"/>
+              <a:t> die variable wird geloggt</a:t>
+            </a:r>
+          </a:p>
+          <a:p>
+            <a:r>
+              <a:rPr lang="de-DE" dirty="0" err="1"/>
+              <a:t>Masked</a:t>
+            </a:r>
+            <a:r>
+              <a:rPr lang="de-DE" dirty="0"/>
+              <a:t> heißt die variable wird nicht geloggt, aber kann in den Einstellungen angesehen werden.</a:t>
+            </a:r>
+          </a:p>
+          <a:p>
+            <a:r>
+              <a:rPr lang="de-DE" dirty="0" err="1"/>
+              <a:t>Protect</a:t>
+            </a:r>
+            <a:r>
+              <a:rPr lang="de-DE" dirty="0"/>
+              <a:t> Variable heißt die variable ist nur in </a:t>
+            </a:r>
+            <a:r>
+              <a:rPr lang="de-DE" dirty="0" err="1"/>
+              <a:t>protected</a:t>
+            </a:r>
+            <a:r>
+              <a:rPr lang="de-DE" dirty="0"/>
+              <a:t> </a:t>
+            </a:r>
+            <a:r>
+              <a:rPr lang="de-DE" dirty="0" err="1"/>
+              <a:t>branches</a:t>
+            </a:r>
+            <a:r>
+              <a:rPr lang="de-DE" dirty="0"/>
+              <a:t> verfügbar</a:t>
+            </a:r>
+          </a:p>
+        </p:txBody>
+      </p:sp>
+      <p:sp>
+        <p:nvSpPr>
+          <p:cNvPr id="4" name="Foliennummernplatzhalter 3"/>
+          <p:cNvSpPr>
+            <a:spLocks noGrp="1"/>
+          </p:cNvSpPr>
+          <p:nvPr>
+            <p:ph type="sldNum" sz="quarter" idx="5"/>
+          </p:nvPr>
+        </p:nvSpPr>
+        <p:spPr/>
+        <p:txBody>
+          <a:bodyPr/>
+          <a:lstStyle/>
+          <a:p>
+            <a:fld id="{18182567-388C-4D33-8B7B-A651F195F118}" type="slidenum">
+              <a:rPr lang="de-DE" altLang="de-DE" smtClean="0"/>
+              <a:pPr/>
+              <a:t>19</a:t>
+            </a:fld>
+            <a:endParaRPr lang="de-DE" altLang="de-DE"/>
+          </a:p>
+        </p:txBody>
+      </p:sp>
+    </p:spTree>
+    <p:extLst>
+      <p:ext uri="{BB962C8B-B14F-4D97-AF65-F5344CB8AC3E}">
+        <p14:creationId xmlns:p14="http://schemas.microsoft.com/office/powerpoint/2010/main" val="1539275154"/>
       </p:ext>
     </p:extLst>
   </p:cSld>
@@ -8917,6 +9151,817 @@
 </p:sld>
 </file>
 
+<file path=ppt/slides/slide16.xml><?xml version="1.0" encoding="utf-8"?>
+<p:sld xmlns:a="http://schemas.openxmlformats.org/drawingml/2006/main" xmlns:r="http://schemas.openxmlformats.org/officeDocument/2006/relationships" xmlns:p="http://schemas.openxmlformats.org/presentationml/2006/main">
+  <p:cSld>
+    <p:spTree>
+      <p:nvGrpSpPr>
+        <p:cNvPr id="1" name=""/>
+        <p:cNvGrpSpPr/>
+        <p:nvPr/>
+      </p:nvGrpSpPr>
+      <p:grpSpPr>
+        <a:xfrm>
+          <a:off x="0" y="0"/>
+          <a:ext cx="0" cy="0"/>
+          <a:chOff x="0" y="0"/>
+          <a:chExt cx="0" cy="0"/>
+        </a:xfrm>
+      </p:grpSpPr>
+      <p:sp>
+        <p:nvSpPr>
+          <p:cNvPr id="4" name="Titel 3">
+            <a:extLst>
+              <a:ext uri="{FF2B5EF4-FFF2-40B4-BE49-F238E27FC236}">
+                <a16:creationId xmlns:a16="http://schemas.microsoft.com/office/drawing/2014/main" id="{D046C25B-B54B-7936-4C86-E895372BF3A4}"/>
+              </a:ext>
+            </a:extLst>
+          </p:cNvPr>
+          <p:cNvSpPr>
+            <a:spLocks noGrp="1"/>
+          </p:cNvSpPr>
+          <p:nvPr>
+            <p:ph type="title"/>
+          </p:nvPr>
+        </p:nvSpPr>
+        <p:spPr/>
+        <p:txBody>
+          <a:bodyPr/>
+          <a:lstStyle/>
+          <a:p>
+            <a:r>
+              <a:rPr lang="en-US" altLang="de-DE" dirty="0" err="1"/>
+              <a:t>Deplo</a:t>
+            </a:r>
+            <a:r>
+              <a:rPr lang="de-DE" altLang="de-DE" dirty="0" err="1"/>
+              <a:t>yment</a:t>
+            </a:r>
+            <a:endParaRPr lang="de-DE" dirty="0"/>
+          </a:p>
+        </p:txBody>
+      </p:sp>
+      <p:sp>
+        <p:nvSpPr>
+          <p:cNvPr id="5" name="Inhaltsplatzhalter 4">
+            <a:extLst>
+              <a:ext uri="{FF2B5EF4-FFF2-40B4-BE49-F238E27FC236}">
+                <a16:creationId xmlns:a16="http://schemas.microsoft.com/office/drawing/2014/main" id="{214865A6-302B-5162-3236-06D650D0C4AB}"/>
+              </a:ext>
+            </a:extLst>
+          </p:cNvPr>
+          <p:cNvSpPr>
+            <a:spLocks noGrp="1"/>
+          </p:cNvSpPr>
+          <p:nvPr>
+            <p:ph idx="1"/>
+          </p:nvPr>
+        </p:nvSpPr>
+        <p:spPr/>
+        <p:txBody>
+          <a:bodyPr/>
+          <a:lstStyle/>
+          <a:p>
+            <a:pPr marL="0" indent="0">
+              <a:buNone/>
+            </a:pPr>
+            <a:r>
+              <a:rPr lang="en-US" b="1" dirty="0" err="1"/>
+              <a:t>Variablen</a:t>
+            </a:r>
+            <a:r>
+              <a:rPr lang="en-US" b="1" dirty="0"/>
+              <a:t> und Secrets</a:t>
+            </a:r>
+            <a:endParaRPr lang="de-DE" b="1" dirty="0"/>
+          </a:p>
+        </p:txBody>
+      </p:sp>
+      <p:pic>
+        <p:nvPicPr>
+          <p:cNvPr id="7" name="Grafik 6" descr="Ein Bild, das computer, Computer, Text, Im Haus enthält.&#10;&#10;Automatisch generierte Beschreibung">
+            <a:extLst>
+              <a:ext uri="{FF2B5EF4-FFF2-40B4-BE49-F238E27FC236}">
+                <a16:creationId xmlns:a16="http://schemas.microsoft.com/office/drawing/2014/main" id="{2A0FAAD3-CEFD-DCD8-B515-FEF2DC88292D}"/>
+              </a:ext>
+            </a:extLst>
+          </p:cNvPr>
+          <p:cNvPicPr>
+            <a:picLocks noChangeAspect="1"/>
+          </p:cNvPicPr>
+          <p:nvPr/>
+        </p:nvPicPr>
+        <p:blipFill>
+          <a:blip r:embed="rId3">
+            <a:extLst>
+              <a:ext uri="{28A0092B-C50C-407E-A947-70E740481C1C}">
+                <a14:useLocalDpi xmlns:a14="http://schemas.microsoft.com/office/drawing/2010/main" val="0"/>
+              </a:ext>
+            </a:extLst>
+          </a:blip>
+          <a:stretch>
+            <a:fillRect/>
+          </a:stretch>
+        </p:blipFill>
+        <p:spPr>
+          <a:xfrm>
+            <a:off x="1231565" y="1772816"/>
+            <a:ext cx="6660232" cy="4440155"/>
+          </a:xfrm>
+          <a:prstGeom prst="rect">
+            <a:avLst/>
+          </a:prstGeom>
+          <a:effectLst>
+            <a:softEdge rad="25400"/>
+          </a:effectLst>
+        </p:spPr>
+      </p:pic>
+    </p:spTree>
+    <p:extLst>
+      <p:ext uri="{BB962C8B-B14F-4D97-AF65-F5344CB8AC3E}">
+        <p14:creationId xmlns:p14="http://schemas.microsoft.com/office/powerpoint/2010/main" val="3590639027"/>
+      </p:ext>
+    </p:extLst>
+  </p:cSld>
+  <p:clrMapOvr>
+    <a:masterClrMapping/>
+  </p:clrMapOvr>
+</p:sld>
+</file>
+
+<file path=ppt/slides/slide17.xml><?xml version="1.0" encoding="utf-8"?>
+<p:sld xmlns:a="http://schemas.openxmlformats.org/drawingml/2006/main" xmlns:r="http://schemas.openxmlformats.org/officeDocument/2006/relationships" xmlns:p="http://schemas.openxmlformats.org/presentationml/2006/main">
+  <p:cSld>
+    <p:spTree>
+      <p:nvGrpSpPr>
+        <p:cNvPr id="1" name=""/>
+        <p:cNvGrpSpPr/>
+        <p:nvPr/>
+      </p:nvGrpSpPr>
+      <p:grpSpPr>
+        <a:xfrm>
+          <a:off x="0" y="0"/>
+          <a:ext cx="0" cy="0"/>
+          <a:chOff x="0" y="0"/>
+          <a:chExt cx="0" cy="0"/>
+        </a:xfrm>
+      </p:grpSpPr>
+      <p:sp>
+        <p:nvSpPr>
+          <p:cNvPr id="4" name="Titel 3">
+            <a:extLst>
+              <a:ext uri="{FF2B5EF4-FFF2-40B4-BE49-F238E27FC236}">
+                <a16:creationId xmlns:a16="http://schemas.microsoft.com/office/drawing/2014/main" id="{DEBA6DE7-EA03-A7D7-3C29-41A22183F800}"/>
+              </a:ext>
+            </a:extLst>
+          </p:cNvPr>
+          <p:cNvSpPr>
+            <a:spLocks noGrp="1"/>
+          </p:cNvSpPr>
+          <p:nvPr>
+            <p:ph type="title"/>
+          </p:nvPr>
+        </p:nvSpPr>
+        <p:spPr/>
+        <p:txBody>
+          <a:bodyPr/>
+          <a:lstStyle/>
+          <a:p>
+            <a:r>
+              <a:rPr lang="en-US" altLang="de-DE" dirty="0" err="1"/>
+              <a:t>Deplo</a:t>
+            </a:r>
+            <a:r>
+              <a:rPr lang="de-DE" altLang="de-DE" dirty="0" err="1"/>
+              <a:t>yment</a:t>
+            </a:r>
+            <a:endParaRPr lang="de-DE" dirty="0"/>
+          </a:p>
+        </p:txBody>
+      </p:sp>
+      <p:sp>
+        <p:nvSpPr>
+          <p:cNvPr id="5" name="Inhaltsplatzhalter 4">
+            <a:extLst>
+              <a:ext uri="{FF2B5EF4-FFF2-40B4-BE49-F238E27FC236}">
+                <a16:creationId xmlns:a16="http://schemas.microsoft.com/office/drawing/2014/main" id="{6959604D-114C-C871-547B-A592BA832626}"/>
+              </a:ext>
+            </a:extLst>
+          </p:cNvPr>
+          <p:cNvSpPr>
+            <a:spLocks noGrp="1"/>
+          </p:cNvSpPr>
+          <p:nvPr>
+            <p:ph idx="1"/>
+          </p:nvPr>
+        </p:nvSpPr>
+        <p:spPr/>
+        <p:txBody>
+          <a:bodyPr/>
+          <a:lstStyle/>
+          <a:p>
+            <a:pPr marL="0" indent="0">
+              <a:buNone/>
+            </a:pPr>
+            <a:r>
+              <a:rPr lang="en-US" b="1" dirty="0" err="1"/>
+              <a:t>Variablen</a:t>
+            </a:r>
+            <a:r>
+              <a:rPr lang="en-US" b="1" dirty="0"/>
+              <a:t> und Secrets</a:t>
+            </a:r>
+          </a:p>
+          <a:p>
+            <a:pPr>
+              <a:buFont typeface="Arial" panose="020B0604020202020204" pitchFamily="34" charset="0"/>
+              <a:buChar char="•"/>
+            </a:pPr>
+            <a:r>
+              <a:rPr lang="de-DE" dirty="0"/>
+              <a:t>Änderungen in Konfiguration zwischen Umgebungen</a:t>
+            </a:r>
+          </a:p>
+          <a:p>
+            <a:pPr>
+              <a:buFont typeface="Arial" panose="020B0604020202020204" pitchFamily="34" charset="0"/>
+              <a:buChar char="•"/>
+            </a:pPr>
+            <a:r>
+              <a:rPr lang="de-DE" dirty="0"/>
+              <a:t>Adressen</a:t>
+            </a:r>
+          </a:p>
+          <a:p>
+            <a:pPr>
+              <a:buFont typeface="Arial" panose="020B0604020202020204" pitchFamily="34" charset="0"/>
+              <a:buChar char="•"/>
+            </a:pPr>
+            <a:r>
+              <a:rPr lang="de-DE" dirty="0"/>
+              <a:t>Zugangsdaten</a:t>
+            </a:r>
+          </a:p>
+        </p:txBody>
+      </p:sp>
+    </p:spTree>
+    <p:extLst>
+      <p:ext uri="{BB962C8B-B14F-4D97-AF65-F5344CB8AC3E}">
+        <p14:creationId xmlns:p14="http://schemas.microsoft.com/office/powerpoint/2010/main" val="3081510875"/>
+      </p:ext>
+    </p:extLst>
+  </p:cSld>
+  <p:clrMapOvr>
+    <a:masterClrMapping/>
+  </p:clrMapOvr>
+</p:sld>
+</file>
+
+<file path=ppt/slides/slide18.xml><?xml version="1.0" encoding="utf-8"?>
+<p:sld xmlns:a="http://schemas.openxmlformats.org/drawingml/2006/main" xmlns:r="http://schemas.openxmlformats.org/officeDocument/2006/relationships" xmlns:p="http://schemas.openxmlformats.org/presentationml/2006/main">
+  <p:cSld>
+    <p:spTree>
+      <p:nvGrpSpPr>
+        <p:cNvPr id="1" name=""/>
+        <p:cNvGrpSpPr/>
+        <p:nvPr/>
+      </p:nvGrpSpPr>
+      <p:grpSpPr>
+        <a:xfrm>
+          <a:off x="0" y="0"/>
+          <a:ext cx="0" cy="0"/>
+          <a:chOff x="0" y="0"/>
+          <a:chExt cx="0" cy="0"/>
+        </a:xfrm>
+      </p:grpSpPr>
+      <p:sp>
+        <p:nvSpPr>
+          <p:cNvPr id="2" name="Titel 1">
+            <a:extLst>
+              <a:ext uri="{FF2B5EF4-FFF2-40B4-BE49-F238E27FC236}">
+                <a16:creationId xmlns:a16="http://schemas.microsoft.com/office/drawing/2014/main" id="{1096DD45-FD3C-3699-46AD-1F87E93B61A3}"/>
+              </a:ext>
+            </a:extLst>
+          </p:cNvPr>
+          <p:cNvSpPr>
+            <a:spLocks noGrp="1"/>
+          </p:cNvSpPr>
+          <p:nvPr>
+            <p:ph type="title"/>
+          </p:nvPr>
+        </p:nvSpPr>
+        <p:spPr/>
+        <p:txBody>
+          <a:bodyPr/>
+          <a:lstStyle/>
+          <a:p>
+            <a:r>
+              <a:rPr lang="en-US" altLang="de-DE" dirty="0" err="1"/>
+              <a:t>Deplo</a:t>
+            </a:r>
+            <a:r>
+              <a:rPr lang="de-DE" altLang="de-DE" dirty="0" err="1"/>
+              <a:t>yment</a:t>
+            </a:r>
+            <a:endParaRPr lang="de-DE" dirty="0"/>
+          </a:p>
+        </p:txBody>
+      </p:sp>
+      <p:sp>
+        <p:nvSpPr>
+          <p:cNvPr id="3" name="Inhaltsplatzhalter 2">
+            <a:extLst>
+              <a:ext uri="{FF2B5EF4-FFF2-40B4-BE49-F238E27FC236}">
+                <a16:creationId xmlns:a16="http://schemas.microsoft.com/office/drawing/2014/main" id="{9C5CB4EF-A9C5-97D9-70B3-564006DCE2E5}"/>
+              </a:ext>
+            </a:extLst>
+          </p:cNvPr>
+          <p:cNvSpPr>
+            <a:spLocks noGrp="1"/>
+          </p:cNvSpPr>
+          <p:nvPr>
+            <p:ph idx="1"/>
+          </p:nvPr>
+        </p:nvSpPr>
+        <p:spPr/>
+        <p:txBody>
+          <a:bodyPr/>
+          <a:lstStyle/>
+          <a:p>
+            <a:pPr marL="0" indent="0">
+              <a:buNone/>
+            </a:pPr>
+            <a:r>
+              <a:rPr lang="de-DE" b="1" dirty="0" err="1"/>
+              <a:t>Gitlab</a:t>
+            </a:r>
+            <a:r>
+              <a:rPr lang="de-DE" b="1" dirty="0"/>
+              <a:t> Variablen</a:t>
+            </a:r>
+          </a:p>
+        </p:txBody>
+      </p:sp>
+      <p:pic>
+        <p:nvPicPr>
+          <p:cNvPr id="5" name="Grafik 4" descr="Ein Bild, das Text, Zahl, Screenshot enthält.&#10;&#10;Automatisch generierte Beschreibung">
+            <a:extLst>
+              <a:ext uri="{FF2B5EF4-FFF2-40B4-BE49-F238E27FC236}">
+                <a16:creationId xmlns:a16="http://schemas.microsoft.com/office/drawing/2014/main" id="{35720101-CC12-8773-3CA7-3FCB8CC736A3}"/>
+              </a:ext>
+            </a:extLst>
+          </p:cNvPr>
+          <p:cNvPicPr>
+            <a:picLocks noChangeAspect="1"/>
+          </p:cNvPicPr>
+          <p:nvPr/>
+        </p:nvPicPr>
+        <p:blipFill>
+          <a:blip r:embed="rId2">
+            <a:extLst>
+              <a:ext uri="{28A0092B-C50C-407E-A947-70E740481C1C}">
+                <a14:useLocalDpi xmlns:a14="http://schemas.microsoft.com/office/drawing/2010/main" val="0"/>
+              </a:ext>
+            </a:extLst>
+          </a:blip>
+          <a:stretch>
+            <a:fillRect/>
+          </a:stretch>
+        </p:blipFill>
+        <p:spPr>
+          <a:xfrm>
+            <a:off x="303661" y="1957191"/>
+            <a:ext cx="8537126" cy="3919734"/>
+          </a:xfrm>
+          <a:prstGeom prst="rect">
+            <a:avLst/>
+          </a:prstGeom>
+        </p:spPr>
+      </p:pic>
+      <p:sp>
+        <p:nvSpPr>
+          <p:cNvPr id="6" name="Rechteck 5">
+            <a:extLst>
+              <a:ext uri="{FF2B5EF4-FFF2-40B4-BE49-F238E27FC236}">
+                <a16:creationId xmlns:a16="http://schemas.microsoft.com/office/drawing/2014/main" id="{DB0A6AD9-31E2-75F8-3933-010C5B19BA87}"/>
+              </a:ext>
+            </a:extLst>
+          </p:cNvPr>
+          <p:cNvSpPr/>
+          <p:nvPr/>
+        </p:nvSpPr>
+        <p:spPr bwMode="auto">
+          <a:xfrm>
+            <a:off x="285720" y="4077072"/>
+            <a:ext cx="1261944" cy="216024"/>
+          </a:xfrm>
+          <a:prstGeom prst="rect">
+            <a:avLst/>
+          </a:prstGeom>
+          <a:solidFill>
+            <a:schemeClr val="accent2">
+              <a:alpha val="51000"/>
+            </a:schemeClr>
+          </a:solidFill>
+          <a:ln w="12700" cap="flat" cmpd="sng" algn="ctr">
+            <a:solidFill>
+              <a:srgbClr val="0D4F3C"/>
+            </a:solidFill>
+            <a:prstDash val="solid"/>
+            <a:round/>
+            <a:headEnd type="none" w="sm" len="sm"/>
+            <a:tailEnd type="none" w="sm" len="sm"/>
+          </a:ln>
+          <a:effectLst/>
+        </p:spPr>
+        <p:txBody>
+          <a:bodyPr vert="horz" wrap="square" lIns="91440" tIns="45720" rIns="91440" bIns="45720" numCol="1" rtlCol="0" anchor="t" anchorCtr="0" compatLnSpc="1">
+            <a:prstTxWarp prst="textNoShape">
+              <a:avLst/>
+            </a:prstTxWarp>
+          </a:bodyPr>
+          <a:lstStyle/>
+          <a:p>
+            <a:pPr marL="0" marR="0" indent="0" algn="l" defTabSz="914400" rtl="0" eaLnBrk="0" fontAlgn="base" latinLnBrk="0" hangingPunct="0">
+              <a:lnSpc>
+                <a:spcPct val="100000"/>
+              </a:lnSpc>
+              <a:spcBef>
+                <a:spcPct val="0"/>
+              </a:spcBef>
+              <a:spcAft>
+                <a:spcPct val="0"/>
+              </a:spcAft>
+              <a:buClrTx/>
+              <a:buSzTx/>
+              <a:buFontTx/>
+              <a:buNone/>
+              <a:tabLst/>
+            </a:pPr>
+            <a:endParaRPr kumimoji="0" lang="de-DE" sz="2400" b="0" i="0" u="none" strike="noStrike" cap="none" normalizeH="0" baseline="0">
+              <a:ln>
+                <a:noFill/>
+              </a:ln>
+              <a:solidFill>
+                <a:schemeClr val="tx1"/>
+              </a:solidFill>
+              <a:effectLst/>
+              <a:latin typeface="Times New Roman" pitchFamily="18" charset="0"/>
+            </a:endParaRPr>
+          </a:p>
+        </p:txBody>
+      </p:sp>
+      <p:sp>
+        <p:nvSpPr>
+          <p:cNvPr id="7" name="Rechteck 6">
+            <a:extLst>
+              <a:ext uri="{FF2B5EF4-FFF2-40B4-BE49-F238E27FC236}">
+                <a16:creationId xmlns:a16="http://schemas.microsoft.com/office/drawing/2014/main" id="{AE85B860-F9A8-52E8-4860-C9E6DA9333F0}"/>
+              </a:ext>
+            </a:extLst>
+          </p:cNvPr>
+          <p:cNvSpPr/>
+          <p:nvPr/>
+        </p:nvSpPr>
+        <p:spPr bwMode="auto">
+          <a:xfrm>
+            <a:off x="282576" y="5202512"/>
+            <a:ext cx="1261944" cy="170704"/>
+          </a:xfrm>
+          <a:prstGeom prst="rect">
+            <a:avLst/>
+          </a:prstGeom>
+          <a:solidFill>
+            <a:schemeClr val="accent2">
+              <a:alpha val="51000"/>
+            </a:schemeClr>
+          </a:solidFill>
+          <a:ln w="12700" cap="flat" cmpd="sng" algn="ctr">
+            <a:solidFill>
+              <a:srgbClr val="0D4F3C"/>
+            </a:solidFill>
+            <a:prstDash val="solid"/>
+            <a:round/>
+            <a:headEnd type="none" w="sm" len="sm"/>
+            <a:tailEnd type="none" w="sm" len="sm"/>
+          </a:ln>
+          <a:effectLst/>
+        </p:spPr>
+        <p:txBody>
+          <a:bodyPr vert="horz" wrap="square" lIns="91440" tIns="45720" rIns="91440" bIns="45720" numCol="1" rtlCol="0" anchor="t" anchorCtr="0" compatLnSpc="1">
+            <a:prstTxWarp prst="textNoShape">
+              <a:avLst/>
+            </a:prstTxWarp>
+          </a:bodyPr>
+          <a:lstStyle/>
+          <a:p>
+            <a:pPr marL="0" marR="0" indent="0" algn="l" defTabSz="914400" rtl="0" eaLnBrk="0" fontAlgn="base" latinLnBrk="0" hangingPunct="0">
+              <a:lnSpc>
+                <a:spcPct val="100000"/>
+              </a:lnSpc>
+              <a:spcBef>
+                <a:spcPct val="0"/>
+              </a:spcBef>
+              <a:spcAft>
+                <a:spcPct val="0"/>
+              </a:spcAft>
+              <a:buClrTx/>
+              <a:buSzTx/>
+              <a:buFontTx/>
+              <a:buNone/>
+              <a:tabLst/>
+            </a:pPr>
+            <a:endParaRPr kumimoji="0" lang="de-DE" sz="2400" b="0" i="0" u="none" strike="noStrike" cap="none" normalizeH="0" baseline="0">
+              <a:ln>
+                <a:noFill/>
+              </a:ln>
+              <a:solidFill>
+                <a:schemeClr val="tx1"/>
+              </a:solidFill>
+              <a:effectLst/>
+              <a:latin typeface="Times New Roman" pitchFamily="18" charset="0"/>
+            </a:endParaRPr>
+          </a:p>
+        </p:txBody>
+      </p:sp>
+      <p:sp>
+        <p:nvSpPr>
+          <p:cNvPr id="8" name="Rechteck 7">
+            <a:extLst>
+              <a:ext uri="{FF2B5EF4-FFF2-40B4-BE49-F238E27FC236}">
+                <a16:creationId xmlns:a16="http://schemas.microsoft.com/office/drawing/2014/main" id="{C1930F78-CD38-ABBC-24FB-60FC85E4FFCA}"/>
+              </a:ext>
+            </a:extLst>
+          </p:cNvPr>
+          <p:cNvSpPr/>
+          <p:nvPr/>
+        </p:nvSpPr>
+        <p:spPr bwMode="auto">
+          <a:xfrm>
+            <a:off x="2267744" y="3917058"/>
+            <a:ext cx="648072" cy="236030"/>
+          </a:xfrm>
+          <a:prstGeom prst="rect">
+            <a:avLst/>
+          </a:prstGeom>
+          <a:solidFill>
+            <a:schemeClr val="accent2">
+              <a:alpha val="51000"/>
+            </a:schemeClr>
+          </a:solidFill>
+          <a:ln w="12700" cap="flat" cmpd="sng" algn="ctr">
+            <a:solidFill>
+              <a:srgbClr val="0D4F3C"/>
+            </a:solidFill>
+            <a:prstDash val="solid"/>
+            <a:round/>
+            <a:headEnd type="none" w="sm" len="sm"/>
+            <a:tailEnd type="none" w="sm" len="sm"/>
+          </a:ln>
+          <a:effectLst/>
+        </p:spPr>
+        <p:txBody>
+          <a:bodyPr vert="horz" wrap="square" lIns="91440" tIns="45720" rIns="91440" bIns="45720" numCol="1" rtlCol="0" anchor="t" anchorCtr="0" compatLnSpc="1">
+            <a:prstTxWarp prst="textNoShape">
+              <a:avLst/>
+            </a:prstTxWarp>
+          </a:bodyPr>
+          <a:lstStyle/>
+          <a:p>
+            <a:pPr marL="0" marR="0" indent="0" algn="l" defTabSz="914400" rtl="0" eaLnBrk="0" fontAlgn="base" latinLnBrk="0" hangingPunct="0">
+              <a:lnSpc>
+                <a:spcPct val="100000"/>
+              </a:lnSpc>
+              <a:spcBef>
+                <a:spcPct val="0"/>
+              </a:spcBef>
+              <a:spcAft>
+                <a:spcPct val="0"/>
+              </a:spcAft>
+              <a:buClrTx/>
+              <a:buSzTx/>
+              <a:buFontTx/>
+              <a:buNone/>
+              <a:tabLst/>
+            </a:pPr>
+            <a:endParaRPr kumimoji="0" lang="de-DE" sz="2400" b="0" i="0" u="none" strike="noStrike" cap="none" normalizeH="0" baseline="0">
+              <a:ln>
+                <a:noFill/>
+              </a:ln>
+              <a:solidFill>
+                <a:schemeClr val="tx1"/>
+              </a:solidFill>
+              <a:effectLst/>
+              <a:latin typeface="Times New Roman" pitchFamily="18" charset="0"/>
+            </a:endParaRPr>
+          </a:p>
+        </p:txBody>
+      </p:sp>
+    </p:spTree>
+    <p:extLst>
+      <p:ext uri="{BB962C8B-B14F-4D97-AF65-F5344CB8AC3E}">
+        <p14:creationId xmlns:p14="http://schemas.microsoft.com/office/powerpoint/2010/main" val="2598376510"/>
+      </p:ext>
+    </p:extLst>
+  </p:cSld>
+  <p:clrMapOvr>
+    <a:masterClrMapping/>
+  </p:clrMapOvr>
+</p:sld>
+</file>
+
+<file path=ppt/slides/slide19.xml><?xml version="1.0" encoding="utf-8"?>
+<p:sld xmlns:a="http://schemas.openxmlformats.org/drawingml/2006/main" xmlns:r="http://schemas.openxmlformats.org/officeDocument/2006/relationships" xmlns:p="http://schemas.openxmlformats.org/presentationml/2006/main">
+  <p:cSld>
+    <p:spTree>
+      <p:nvGrpSpPr>
+        <p:cNvPr id="1" name=""/>
+        <p:cNvGrpSpPr/>
+        <p:nvPr/>
+      </p:nvGrpSpPr>
+      <p:grpSpPr>
+        <a:xfrm>
+          <a:off x="0" y="0"/>
+          <a:ext cx="0" cy="0"/>
+          <a:chOff x="0" y="0"/>
+          <a:chExt cx="0" cy="0"/>
+        </a:xfrm>
+      </p:grpSpPr>
+      <p:sp>
+        <p:nvSpPr>
+          <p:cNvPr id="2" name="Titel 1">
+            <a:extLst>
+              <a:ext uri="{FF2B5EF4-FFF2-40B4-BE49-F238E27FC236}">
+                <a16:creationId xmlns:a16="http://schemas.microsoft.com/office/drawing/2014/main" id="{B94361C9-5FAC-CC87-FE4E-237033226990}"/>
+              </a:ext>
+            </a:extLst>
+          </p:cNvPr>
+          <p:cNvSpPr>
+            <a:spLocks noGrp="1"/>
+          </p:cNvSpPr>
+          <p:nvPr>
+            <p:ph type="title"/>
+          </p:nvPr>
+        </p:nvSpPr>
+        <p:spPr/>
+        <p:txBody>
+          <a:bodyPr/>
+          <a:lstStyle/>
+          <a:p>
+            <a:r>
+              <a:rPr lang="en-US" altLang="de-DE" dirty="0" err="1"/>
+              <a:t>Deplo</a:t>
+            </a:r>
+            <a:r>
+              <a:rPr lang="de-DE" altLang="de-DE" dirty="0" err="1"/>
+              <a:t>yment</a:t>
+            </a:r>
+            <a:endParaRPr lang="de-DE" dirty="0"/>
+          </a:p>
+        </p:txBody>
+      </p:sp>
+      <p:sp>
+        <p:nvSpPr>
+          <p:cNvPr id="3" name="Inhaltsplatzhalter 2">
+            <a:extLst>
+              <a:ext uri="{FF2B5EF4-FFF2-40B4-BE49-F238E27FC236}">
+                <a16:creationId xmlns:a16="http://schemas.microsoft.com/office/drawing/2014/main" id="{584D3E0E-4B6B-3AC9-B7DC-1E4994358F13}"/>
+              </a:ext>
+            </a:extLst>
+          </p:cNvPr>
+          <p:cNvSpPr>
+            <a:spLocks noGrp="1"/>
+          </p:cNvSpPr>
+          <p:nvPr>
+            <p:ph idx="1"/>
+          </p:nvPr>
+        </p:nvSpPr>
+        <p:spPr/>
+        <p:txBody>
+          <a:bodyPr/>
+          <a:lstStyle/>
+          <a:p>
+            <a:pPr marL="0" indent="0">
+              <a:buNone/>
+            </a:pPr>
+            <a:r>
+              <a:rPr lang="de-DE" b="1" dirty="0" err="1"/>
+              <a:t>Gitlab</a:t>
+            </a:r>
+            <a:r>
+              <a:rPr lang="de-DE" b="1" dirty="0"/>
+              <a:t> Variablen</a:t>
+            </a:r>
+          </a:p>
+          <a:p>
+            <a:pPr>
+              <a:buFont typeface="Arial" panose="020B0604020202020204" pitchFamily="34" charset="0"/>
+              <a:buChar char="•"/>
+            </a:pPr>
+            <a:r>
+              <a:rPr lang="de-DE" dirty="0"/>
+              <a:t>Keine externen Tools</a:t>
+            </a:r>
+          </a:p>
+          <a:p>
+            <a:pPr>
+              <a:buFont typeface="Arial" panose="020B0604020202020204" pitchFamily="34" charset="0"/>
+              <a:buChar char="•"/>
+            </a:pPr>
+            <a:r>
+              <a:rPr lang="de-DE" dirty="0"/>
+              <a:t>Begrenzte Sicherheit</a:t>
+            </a:r>
+          </a:p>
+          <a:p>
+            <a:pPr lvl="1">
+              <a:buFont typeface="Arial" panose="020B0604020202020204" pitchFamily="34" charset="0"/>
+              <a:buChar char="•"/>
+            </a:pPr>
+            <a:r>
+              <a:rPr lang="de-DE" dirty="0"/>
+              <a:t>Jeder der Projekteinstellungen bearbeiten kann, kann sie sehen</a:t>
+            </a:r>
+          </a:p>
+          <a:p>
+            <a:pPr lvl="1">
+              <a:buFont typeface="Arial" panose="020B0604020202020204" pitchFamily="34" charset="0"/>
+              <a:buChar char="•"/>
+            </a:pPr>
+            <a:r>
+              <a:rPr lang="de-DE" dirty="0"/>
+              <a:t>Können mit fehlerhafter </a:t>
+            </a:r>
+            <a:r>
+              <a:rPr lang="de-DE" dirty="0" err="1"/>
+              <a:t>pipeline</a:t>
+            </a:r>
+            <a:r>
+              <a:rPr lang="de-DE" dirty="0"/>
+              <a:t> geloggt werden</a:t>
+            </a:r>
+          </a:p>
+          <a:p>
+            <a:pPr>
+              <a:buFont typeface="Arial" panose="020B0604020202020204" pitchFamily="34" charset="0"/>
+              <a:buChar char="•"/>
+            </a:pPr>
+            <a:r>
+              <a:rPr lang="de-DE" dirty="0"/>
+              <a:t>Müssen richtig Konfiguriert sein</a:t>
+            </a:r>
+          </a:p>
+          <a:p>
+            <a:pPr lvl="1">
+              <a:buFont typeface="Arial" panose="020B0604020202020204" pitchFamily="34" charset="0"/>
+              <a:buChar char="•"/>
+            </a:pPr>
+            <a:r>
+              <a:rPr lang="de-DE" dirty="0"/>
+              <a:t>Visible oder </a:t>
+            </a:r>
+            <a:r>
+              <a:rPr lang="de-DE" dirty="0" err="1"/>
+              <a:t>Masked</a:t>
+            </a:r>
+            <a:endParaRPr lang="de-DE" dirty="0"/>
+          </a:p>
+          <a:p>
+            <a:pPr lvl="1">
+              <a:buFont typeface="Arial" panose="020B0604020202020204" pitchFamily="34" charset="0"/>
+              <a:buChar char="•"/>
+            </a:pPr>
+            <a:r>
+              <a:rPr lang="de-DE" dirty="0" err="1"/>
+              <a:t>Protect</a:t>
+            </a:r>
+            <a:r>
+              <a:rPr lang="de-DE" dirty="0"/>
+              <a:t> Variable</a:t>
+            </a:r>
+          </a:p>
+          <a:p>
+            <a:pPr>
+              <a:buFont typeface="Arial" panose="020B0604020202020204" pitchFamily="34" charset="0"/>
+              <a:buChar char="•"/>
+            </a:pPr>
+            <a:endParaRPr lang="de-DE" dirty="0"/>
+          </a:p>
+        </p:txBody>
+      </p:sp>
+    </p:spTree>
+    <p:extLst>
+      <p:ext uri="{BB962C8B-B14F-4D97-AF65-F5344CB8AC3E}">
+        <p14:creationId xmlns:p14="http://schemas.microsoft.com/office/powerpoint/2010/main" val="794405756"/>
+      </p:ext>
+    </p:extLst>
+  </p:cSld>
+  <p:clrMapOvr>
+    <a:masterClrMapping/>
+  </p:clrMapOvr>
+</p:sld>
+</file>
+
 <file path=ppt/slides/slide2.xml><?xml version="1.0" encoding="utf-8"?>
 <p:sld xmlns:a="http://schemas.openxmlformats.org/drawingml/2006/main" xmlns:r="http://schemas.openxmlformats.org/officeDocument/2006/relationships" xmlns:p="http://schemas.openxmlformats.org/presentationml/2006/main">
   <p:cSld>
@@ -9322,6 +10367,105 @@
         </p:txBody>
       </p:sp>
     </p:spTree>
+  </p:cSld>
+  <p:clrMapOvr>
+    <a:masterClrMapping/>
+  </p:clrMapOvr>
+</p:sld>
+</file>
+
+<file path=ppt/slides/slide20.xml><?xml version="1.0" encoding="utf-8"?>
+<p:sld xmlns:a="http://schemas.openxmlformats.org/drawingml/2006/main" xmlns:r="http://schemas.openxmlformats.org/officeDocument/2006/relationships" xmlns:p="http://schemas.openxmlformats.org/presentationml/2006/main">
+  <p:cSld>
+    <p:spTree>
+      <p:nvGrpSpPr>
+        <p:cNvPr id="1" name=""/>
+        <p:cNvGrpSpPr/>
+        <p:nvPr/>
+      </p:nvGrpSpPr>
+      <p:grpSpPr>
+        <a:xfrm>
+          <a:off x="0" y="0"/>
+          <a:ext cx="0" cy="0"/>
+          <a:chOff x="0" y="0"/>
+          <a:chExt cx="0" cy="0"/>
+        </a:xfrm>
+      </p:grpSpPr>
+      <p:sp>
+        <p:nvSpPr>
+          <p:cNvPr id="4" name="Titel 3">
+            <a:extLst>
+              <a:ext uri="{FF2B5EF4-FFF2-40B4-BE49-F238E27FC236}">
+                <a16:creationId xmlns:a16="http://schemas.microsoft.com/office/drawing/2014/main" id="{9FC7795F-6E01-F5BF-ACE2-1C2BA81DA7F2}"/>
+              </a:ext>
+            </a:extLst>
+          </p:cNvPr>
+          <p:cNvSpPr>
+            <a:spLocks noGrp="1"/>
+          </p:cNvSpPr>
+          <p:nvPr>
+            <p:ph type="title"/>
+          </p:nvPr>
+        </p:nvSpPr>
+        <p:spPr/>
+        <p:txBody>
+          <a:bodyPr/>
+          <a:lstStyle/>
+          <a:p>
+            <a:r>
+              <a:rPr lang="en-US" altLang="de-DE" dirty="0" err="1"/>
+              <a:t>Deplo</a:t>
+            </a:r>
+            <a:r>
+              <a:rPr lang="de-DE" altLang="de-DE" dirty="0" err="1"/>
+              <a:t>yment</a:t>
+            </a:r>
+            <a:endParaRPr lang="de-DE" dirty="0"/>
+          </a:p>
+        </p:txBody>
+      </p:sp>
+      <p:sp>
+        <p:nvSpPr>
+          <p:cNvPr id="5" name="Inhaltsplatzhalter 4">
+            <a:extLst>
+              <a:ext uri="{FF2B5EF4-FFF2-40B4-BE49-F238E27FC236}">
+                <a16:creationId xmlns:a16="http://schemas.microsoft.com/office/drawing/2014/main" id="{369AD538-3B05-3972-3EDA-255CDFB9FDDA}"/>
+              </a:ext>
+            </a:extLst>
+          </p:cNvPr>
+          <p:cNvSpPr>
+            <a:spLocks noGrp="1"/>
+          </p:cNvSpPr>
+          <p:nvPr>
+            <p:ph idx="1"/>
+          </p:nvPr>
+        </p:nvSpPr>
+        <p:spPr/>
+        <p:txBody>
+          <a:bodyPr/>
+          <a:lstStyle/>
+          <a:p>
+            <a:pPr marL="0" indent="0">
+              <a:buNone/>
+            </a:pPr>
+            <a:r>
+              <a:rPr lang="de-DE" b="1" dirty="0"/>
+              <a:t>TODO: Secrets mit Secret </a:t>
+            </a:r>
+            <a:r>
+              <a:rPr lang="de-DE" b="1" dirty="0" err="1"/>
+              <a:t>providers</a:t>
+            </a:r>
+            <a:endParaRPr lang="de-DE" b="1" dirty="0"/>
+          </a:p>
+        </p:txBody>
+      </p:sp>
+    </p:spTree>
+    <p:extLst>
+      <p:ext uri="{BB962C8B-B14F-4D97-AF65-F5344CB8AC3E}">
+        <p14:creationId xmlns:p14="http://schemas.microsoft.com/office/powerpoint/2010/main" val="2545660556"/>
+      </p:ext>
+    </p:extLst>
   </p:cSld>
   <p:clrMapOvr>
     <a:masterClrMapping/>

</xml_diff>

<commit_message>
Polish und Ergänzung 3-5
</commit_message>
<xml_diff>
--- a/slides/Tag-3_5-Deployment-Strategien.pptx
+++ b/slides/Tag-3_5-Deployment-Strategien.pptx
@@ -1502,6 +1502,14 @@
           <a:bodyPr/>
           <a:lstStyle/>
           <a:p>
+            <a:r>
+              <a:rPr lang="de-DE" dirty="0"/>
+              <a:t>Einige Werte müssen vertraulich </a:t>
+            </a:r>
+            <a:r>
+              <a:rPr lang="de-DE"/>
+              <a:t>behandelt werden.</a:t>
+            </a:r>
             <a:endParaRPr lang="de-DE" dirty="0"/>
           </a:p>
         </p:txBody>
@@ -1638,6 +1646,20 @@
             <a:r>
               <a:rPr lang="de-DE" dirty="0"/>
               <a:t> verfügbar</a:t>
+            </a:r>
+          </a:p>
+          <a:p>
+            <a:r>
+              <a:rPr lang="de-DE" dirty="0"/>
+              <a:t>Überschreiben von Variablen kann es unklar machen, wo der </a:t>
+            </a:r>
+            <a:r>
+              <a:rPr lang="de-DE" dirty="0" err="1"/>
+              <a:t>runtime</a:t>
+            </a:r>
+            <a:r>
+              <a:rPr lang="de-DE" dirty="0"/>
+              <a:t> Wert herkommt.</a:t>
             </a:r>
           </a:p>
         </p:txBody>
@@ -9766,7 +9788,7 @@
             </a:pPr>
             <a:r>
               <a:rPr lang="de-DE" dirty="0"/>
-              <a:t>Konfiguration von Containern</a:t>
+              <a:t>Konfiguration von Docker Containern</a:t>
             </a:r>
           </a:p>
         </p:txBody>

</xml_diff>